<commit_message>
added week 4 training materials
</commit_message>
<xml_diff>
--- a/Learning Phase/Week 4/Day 16/1. Node.js/Slides/6. Working with Web Servers/working-with-web-servers-slides.pptx
+++ b/Learning Phase/Week 4/Day 16/1. Node.js/Slides/6. Working with Web Servers/working-with-web-servers-slides.pptx
@@ -5,17 +5,127 @@
     <p:sldMasterId id="2147483648" r:id="rId1"/>
   </p:sldMasterIdLst>
   <p:sldIdLst>
-    <p:sldId id="256" r:id="rId6"/>
-    <p:sldId id="257" r:id="rId7"/>
-    <p:sldId id="258" r:id="rId8"/>
+    <p:sldId id="256" r:id="rId2"/>
+    <p:sldId id="257" r:id="rId3"/>
   </p:sldIdLst>
   <p:sldSz cx="12192000" cy="6858000"/>
   <p:notesSz cx="12192000" cy="6858000"/>
+  <p:defaultTextStyle>
+    <a:defPPr>
+      <a:defRPr lang="en-US"/>
+    </a:defPPr>
+    <a:lvl1pPr marL="0" algn="l" defTabSz="914400" rtl="0" eaLnBrk="1" latinLnBrk="0" hangingPunct="1">
+      <a:defRPr sz="1800" kern="1200">
+        <a:solidFill>
+          <a:schemeClr val="tx1"/>
+        </a:solidFill>
+        <a:latin typeface="+mn-lt"/>
+        <a:ea typeface="+mn-ea"/>
+        <a:cs typeface="+mn-cs"/>
+      </a:defRPr>
+    </a:lvl1pPr>
+    <a:lvl2pPr marL="457200" algn="l" defTabSz="914400" rtl="0" eaLnBrk="1" latinLnBrk="0" hangingPunct="1">
+      <a:defRPr sz="1800" kern="1200">
+        <a:solidFill>
+          <a:schemeClr val="tx1"/>
+        </a:solidFill>
+        <a:latin typeface="+mn-lt"/>
+        <a:ea typeface="+mn-ea"/>
+        <a:cs typeface="+mn-cs"/>
+      </a:defRPr>
+    </a:lvl2pPr>
+    <a:lvl3pPr marL="914400" algn="l" defTabSz="914400" rtl="0" eaLnBrk="1" latinLnBrk="0" hangingPunct="1">
+      <a:defRPr sz="1800" kern="1200">
+        <a:solidFill>
+          <a:schemeClr val="tx1"/>
+        </a:solidFill>
+        <a:latin typeface="+mn-lt"/>
+        <a:ea typeface="+mn-ea"/>
+        <a:cs typeface="+mn-cs"/>
+      </a:defRPr>
+    </a:lvl3pPr>
+    <a:lvl4pPr marL="1371600" algn="l" defTabSz="914400" rtl="0" eaLnBrk="1" latinLnBrk="0" hangingPunct="1">
+      <a:defRPr sz="1800" kern="1200">
+        <a:solidFill>
+          <a:schemeClr val="tx1"/>
+        </a:solidFill>
+        <a:latin typeface="+mn-lt"/>
+        <a:ea typeface="+mn-ea"/>
+        <a:cs typeface="+mn-cs"/>
+      </a:defRPr>
+    </a:lvl4pPr>
+    <a:lvl5pPr marL="1828800" algn="l" defTabSz="914400" rtl="0" eaLnBrk="1" latinLnBrk="0" hangingPunct="1">
+      <a:defRPr sz="1800" kern="1200">
+        <a:solidFill>
+          <a:schemeClr val="tx1"/>
+        </a:solidFill>
+        <a:latin typeface="+mn-lt"/>
+        <a:ea typeface="+mn-ea"/>
+        <a:cs typeface="+mn-cs"/>
+      </a:defRPr>
+    </a:lvl5pPr>
+    <a:lvl6pPr marL="2286000" algn="l" defTabSz="914400" rtl="0" eaLnBrk="1" latinLnBrk="0" hangingPunct="1">
+      <a:defRPr sz="1800" kern="1200">
+        <a:solidFill>
+          <a:schemeClr val="tx1"/>
+        </a:solidFill>
+        <a:latin typeface="+mn-lt"/>
+        <a:ea typeface="+mn-ea"/>
+        <a:cs typeface="+mn-cs"/>
+      </a:defRPr>
+    </a:lvl6pPr>
+    <a:lvl7pPr marL="2743200" algn="l" defTabSz="914400" rtl="0" eaLnBrk="1" latinLnBrk="0" hangingPunct="1">
+      <a:defRPr sz="1800" kern="1200">
+        <a:solidFill>
+          <a:schemeClr val="tx1"/>
+        </a:solidFill>
+        <a:latin typeface="+mn-lt"/>
+        <a:ea typeface="+mn-ea"/>
+        <a:cs typeface="+mn-cs"/>
+      </a:defRPr>
+    </a:lvl7pPr>
+    <a:lvl8pPr marL="3200400" algn="l" defTabSz="914400" rtl="0" eaLnBrk="1" latinLnBrk="0" hangingPunct="1">
+      <a:defRPr sz="1800" kern="1200">
+        <a:solidFill>
+          <a:schemeClr val="tx1"/>
+        </a:solidFill>
+        <a:latin typeface="+mn-lt"/>
+        <a:ea typeface="+mn-ea"/>
+        <a:cs typeface="+mn-cs"/>
+      </a:defRPr>
+    </a:lvl8pPr>
+    <a:lvl9pPr marL="3657600" algn="l" defTabSz="914400" rtl="0" eaLnBrk="1" latinLnBrk="0" hangingPunct="1">
+      <a:defRPr sz="1800" kern="1200">
+        <a:solidFill>
+          <a:schemeClr val="tx1"/>
+        </a:solidFill>
+        <a:latin typeface="+mn-lt"/>
+        <a:ea typeface="+mn-ea"/>
+        <a:cs typeface="+mn-cs"/>
+      </a:defRPr>
+    </a:lvl9pPr>
+  </p:defaultTextStyle>
+  <p:extLst>
+    <p:ext uri="{EFAFB233-063F-42B5-8137-9DF3F51BA10A}">
+      <p15:sldGuideLst xmlns:p15="http://schemas.microsoft.com/office/powerpoint/2012/main">
+        <p15:guide id="1" orient="horz" pos="2880">
+          <p15:clr>
+            <a:srgbClr val="A4A3A4"/>
+          </p15:clr>
+        </p15:guide>
+        <p15:guide id="2" pos="2160">
+          <p15:clr>
+            <a:srgbClr val="A4A3A4"/>
+          </p15:clr>
+        </p15:guide>
+      </p15:sldGuideLst>
+    </p:ext>
+  </p:extLst>
 </p:presentation>
 </file>
 
 <file path=ppt/slideLayouts/slideLayout1.xml><?xml version="1.0" encoding="utf-8"?>
-<p:sldLayout xmlns:a="http://schemas.openxmlformats.org/drawingml/2006/main" xmlns:r="http://schemas.openxmlformats.org/officeDocument/2006/relationships" xmlns:p="http://schemas.openxmlformats.org/presentationml/2006/main" preserve="1" type="obj" showMasterSp="0">
+<p:sldLayout xmlns:a="http://schemas.openxmlformats.org/drawingml/2006/main" xmlns:r="http://schemas.openxmlformats.org/officeDocument/2006/relationships" xmlns:p="http://schemas.openxmlformats.org/presentationml/2006/main" showMasterSp="0" type="obj" preserve="1">
   <p:cSld name="Title Slide">
     <p:bg>
       <p:bgPr>
@@ -41,34 +151,12 @@
       </p:grpSpPr>
       <p:pic>
         <p:nvPicPr>
-          <p:cNvPr id="16" name="bg object 16"/>
+          <p:cNvPr id="17" name="bg object 17"/>
           <p:cNvPicPr/>
           <p:nvPr/>
         </p:nvPicPr>
         <p:blipFill>
           <a:blip r:embed="rId2" cstate="print"/>
-          <a:stretch>
-            <a:fillRect/>
-          </a:stretch>
-        </p:blipFill>
-        <p:spPr>
-          <a:xfrm>
-            <a:off x="11494007" y="6184391"/>
-            <a:ext cx="454151" cy="451104"/>
-          </a:xfrm>
-          <a:prstGeom prst="rect">
-            <a:avLst/>
-          </a:prstGeom>
-        </p:spPr>
-      </p:pic>
-      <p:pic>
-        <p:nvPicPr>
-          <p:cNvPr id="17" name="bg object 17"/>
-          <p:cNvPicPr/>
-          <p:nvPr/>
-        </p:nvPicPr>
-        <p:blipFill>
-          <a:blip r:embed="rId3" cstate="print"/>
           <a:stretch>
             <a:fillRect/>
           </a:stretch>
@@ -115,7 +203,9 @@
               </a:defRPr>
             </a:lvl1pPr>
           </a:lstStyle>
-          <a:p/>
+          <a:p>
+            <a:endParaRPr/>
+          </a:p>
         </p:txBody>
       </p:sp>
       <p:sp>
@@ -146,7 +236,9 @@
               <a:defRPr/>
             </a:lvl1pPr>
           </a:lstStyle>
-          <a:p/>
+          <a:p>
+            <a:endParaRPr/>
+          </a:p>
         </p:txBody>
       </p:sp>
       <p:sp>
@@ -156,7 +248,7 @@
             <a:spLocks noGrp="1"/>
           </p:cNvSpPr>
           <p:nvPr>
-            <p:ph type="ftr" idx="5" sz="quarter"/>
+            <p:ph type="ftr" sz="quarter" idx="5"/>
           </p:nvPr>
         </p:nvSpPr>
         <p:spPr/>
@@ -173,7 +265,9 @@
               </a:defRPr>
             </a:lvl1pPr>
           </a:lstStyle>
-          <a:p/>
+          <a:p>
+            <a:endParaRPr/>
+          </a:p>
         </p:txBody>
       </p:sp>
       <p:sp>
@@ -183,7 +277,7 @@
             <a:spLocks noGrp="1"/>
           </p:cNvSpPr>
           <p:nvPr>
-            <p:ph type="dt" idx="6" sz="half"/>
+            <p:ph type="dt" sz="half" idx="6"/>
           </p:nvPr>
         </p:nvSpPr>
         <p:spPr/>
@@ -203,7 +297,9 @@
           <a:p>
             <a:fld id="{1D8BD707-D9CF-40AE-B4C6-C98DA3205C09}" type="datetimeFigureOut">
               <a:rPr lang="en-US"/>
+              <a:t>12/19/2024</a:t>
             </a:fld>
+            <a:endParaRPr lang="en-US"/>
           </a:p>
         </p:txBody>
       </p:sp>
@@ -214,7 +310,7 @@
             <a:spLocks noGrp="1"/>
           </p:cNvSpPr>
           <p:nvPr>
-            <p:ph type="sldNum" idx="7" sz="quarter"/>
+            <p:ph type="sldNum" sz="quarter" idx="7"/>
           </p:nvPr>
         </p:nvSpPr>
         <p:spPr/>
@@ -233,8 +329,9 @@
           </a:lstStyle>
           <a:p>
             <a:fld id="{B6F15528-21DE-4FAA-801E-634DDDAF4B2B}" type="slidenum">
-              <a:t>#</a:t>
+              <a:t>‹#›</a:t>
             </a:fld>
+            <a:endParaRPr/>
           </a:p>
         </p:txBody>
       </p:sp>
@@ -247,7 +344,7 @@
 </file>
 
 <file path=ppt/slideLayouts/slideLayout2.xml><?xml version="1.0" encoding="utf-8"?>
-<p:sldLayout xmlns:a="http://schemas.openxmlformats.org/drawingml/2006/main" xmlns:r="http://schemas.openxmlformats.org/officeDocument/2006/relationships" xmlns:p="http://schemas.openxmlformats.org/presentationml/2006/main" preserve="1" type="obj">
+<p:sldLayout xmlns:a="http://schemas.openxmlformats.org/drawingml/2006/main" xmlns:r="http://schemas.openxmlformats.org/officeDocument/2006/relationships" xmlns:p="http://schemas.openxmlformats.org/presentationml/2006/main" type="obj" preserve="1">
   <p:cSld name="Title and Content">
     <p:spTree>
       <p:nvGrpSpPr>
@@ -287,7 +384,9 @@
               </a:defRPr>
             </a:lvl1pPr>
           </a:lstStyle>
-          <a:p/>
+          <a:p>
+            <a:endParaRPr/>
+          </a:p>
         </p:txBody>
       </p:sp>
       <p:sp>
@@ -308,7 +407,9 @@
               <a:defRPr/>
             </a:lvl1pPr>
           </a:lstStyle>
-          <a:p/>
+          <a:p>
+            <a:endParaRPr dirty="0"/>
+          </a:p>
         </p:txBody>
       </p:sp>
       <p:sp>
@@ -318,7 +419,7 @@
             <a:spLocks noGrp="1"/>
           </p:cNvSpPr>
           <p:nvPr>
-            <p:ph type="ftr" idx="5" sz="quarter"/>
+            <p:ph type="ftr" sz="quarter" idx="5"/>
           </p:nvPr>
         </p:nvSpPr>
         <p:spPr/>
@@ -335,7 +436,9 @@
               </a:defRPr>
             </a:lvl1pPr>
           </a:lstStyle>
-          <a:p/>
+          <a:p>
+            <a:endParaRPr/>
+          </a:p>
         </p:txBody>
       </p:sp>
       <p:sp>
@@ -345,7 +448,7 @@
             <a:spLocks noGrp="1"/>
           </p:cNvSpPr>
           <p:nvPr>
-            <p:ph type="dt" idx="6" sz="half"/>
+            <p:ph type="dt" sz="half" idx="6"/>
           </p:nvPr>
         </p:nvSpPr>
         <p:spPr/>
@@ -365,7 +468,9 @@
           <a:p>
             <a:fld id="{1D8BD707-D9CF-40AE-B4C6-C98DA3205C09}" type="datetimeFigureOut">
               <a:rPr lang="en-US"/>
+              <a:t>12/19/2024</a:t>
             </a:fld>
+            <a:endParaRPr lang="en-US"/>
           </a:p>
         </p:txBody>
       </p:sp>
@@ -376,7 +481,7 @@
             <a:spLocks noGrp="1"/>
           </p:cNvSpPr>
           <p:nvPr>
-            <p:ph type="sldNum" idx="7" sz="quarter"/>
+            <p:ph type="sldNum" sz="quarter" idx="7"/>
           </p:nvPr>
         </p:nvSpPr>
         <p:spPr/>
@@ -395,8 +500,9 @@
           </a:lstStyle>
           <a:p>
             <a:fld id="{B6F15528-21DE-4FAA-801E-634DDDAF4B2B}" type="slidenum">
-              <a:t>#</a:t>
+              <a:t>‹#›</a:t>
             </a:fld>
+            <a:endParaRPr/>
           </a:p>
         </p:txBody>
       </p:sp>
@@ -409,7 +515,7 @@
 </file>
 
 <file path=ppt/slideLayouts/slideLayout3.xml><?xml version="1.0" encoding="utf-8"?>
-<p:sldLayout xmlns:a="http://schemas.openxmlformats.org/drawingml/2006/main" xmlns:r="http://schemas.openxmlformats.org/officeDocument/2006/relationships" xmlns:p="http://schemas.openxmlformats.org/presentationml/2006/main" preserve="1" type="obj">
+<p:sldLayout xmlns:a="http://schemas.openxmlformats.org/drawingml/2006/main" xmlns:r="http://schemas.openxmlformats.org/officeDocument/2006/relationships" xmlns:p="http://schemas.openxmlformats.org/presentationml/2006/main" type="obj" preserve="1">
   <p:cSld name="Two Content">
     <p:spTree>
       <p:nvGrpSpPr>
@@ -449,7 +555,9 @@
               </a:defRPr>
             </a:lvl1pPr>
           </a:lstStyle>
-          <a:p/>
+          <a:p>
+            <a:endParaRPr/>
+          </a:p>
         </p:txBody>
       </p:sp>
       <p:sp>
@@ -459,7 +567,7 @@
             <a:spLocks noGrp="1"/>
           </p:cNvSpPr>
           <p:nvPr>
-            <p:ph idx="2" sz="half"/>
+            <p:ph sz="half" idx="2"/>
           </p:nvPr>
         </p:nvSpPr>
         <p:spPr>
@@ -480,7 +588,9 @@
               <a:defRPr/>
             </a:lvl1pPr>
           </a:lstStyle>
-          <a:p/>
+          <a:p>
+            <a:endParaRPr/>
+          </a:p>
         </p:txBody>
       </p:sp>
       <p:sp>
@@ -490,7 +600,7 @@
             <a:spLocks noGrp="1"/>
           </p:cNvSpPr>
           <p:nvPr>
-            <p:ph idx="3" sz="half"/>
+            <p:ph sz="half" idx="3"/>
           </p:nvPr>
         </p:nvSpPr>
         <p:spPr>
@@ -511,7 +621,9 @@
               <a:defRPr/>
             </a:lvl1pPr>
           </a:lstStyle>
-          <a:p/>
+          <a:p>
+            <a:endParaRPr/>
+          </a:p>
         </p:txBody>
       </p:sp>
       <p:sp>
@@ -521,7 +633,7 @@
             <a:spLocks noGrp="1"/>
           </p:cNvSpPr>
           <p:nvPr>
-            <p:ph type="ftr" idx="5" sz="quarter"/>
+            <p:ph type="ftr" sz="quarter" idx="5"/>
           </p:nvPr>
         </p:nvSpPr>
         <p:spPr/>
@@ -538,7 +650,9 @@
               </a:defRPr>
             </a:lvl1pPr>
           </a:lstStyle>
-          <a:p/>
+          <a:p>
+            <a:endParaRPr/>
+          </a:p>
         </p:txBody>
       </p:sp>
       <p:sp>
@@ -548,7 +662,7 @@
             <a:spLocks noGrp="1"/>
           </p:cNvSpPr>
           <p:nvPr>
-            <p:ph type="dt" idx="6" sz="half"/>
+            <p:ph type="dt" sz="half" idx="6"/>
           </p:nvPr>
         </p:nvSpPr>
         <p:spPr/>
@@ -568,7 +682,9 @@
           <a:p>
             <a:fld id="{1D8BD707-D9CF-40AE-B4C6-C98DA3205C09}" type="datetimeFigureOut">
               <a:rPr lang="en-US"/>
+              <a:t>12/19/2024</a:t>
             </a:fld>
+            <a:endParaRPr lang="en-US"/>
           </a:p>
         </p:txBody>
       </p:sp>
@@ -579,7 +695,7 @@
             <a:spLocks noGrp="1"/>
           </p:cNvSpPr>
           <p:nvPr>
-            <p:ph type="sldNum" idx="7" sz="quarter"/>
+            <p:ph type="sldNum" sz="quarter" idx="7"/>
           </p:nvPr>
         </p:nvSpPr>
         <p:spPr/>
@@ -598,8 +714,9 @@
           </a:lstStyle>
           <a:p>
             <a:fld id="{B6F15528-21DE-4FAA-801E-634DDDAF4B2B}" type="slidenum">
-              <a:t>#</a:t>
+              <a:t>‹#›</a:t>
             </a:fld>
+            <a:endParaRPr/>
           </a:p>
         </p:txBody>
       </p:sp>
@@ -612,7 +729,7 @@
 </file>
 
 <file path=ppt/slideLayouts/slideLayout4.xml><?xml version="1.0" encoding="utf-8"?>
-<p:sldLayout xmlns:a="http://schemas.openxmlformats.org/drawingml/2006/main" xmlns:r="http://schemas.openxmlformats.org/officeDocument/2006/relationships" xmlns:p="http://schemas.openxmlformats.org/presentationml/2006/main" preserve="1" type="obj">
+<p:sldLayout xmlns:a="http://schemas.openxmlformats.org/drawingml/2006/main" xmlns:r="http://schemas.openxmlformats.org/officeDocument/2006/relationships" xmlns:p="http://schemas.openxmlformats.org/presentationml/2006/main" type="obj" preserve="1">
   <p:cSld name="Title Only">
     <p:spTree>
       <p:nvGrpSpPr>
@@ -652,7 +769,9 @@
               </a:defRPr>
             </a:lvl1pPr>
           </a:lstStyle>
-          <a:p/>
+          <a:p>
+            <a:endParaRPr/>
+          </a:p>
         </p:txBody>
       </p:sp>
       <p:sp>
@@ -662,7 +781,7 @@
             <a:spLocks noGrp="1"/>
           </p:cNvSpPr>
           <p:nvPr>
-            <p:ph type="ftr" idx="5" sz="quarter"/>
+            <p:ph type="ftr" sz="quarter" idx="5"/>
           </p:nvPr>
         </p:nvSpPr>
         <p:spPr/>
@@ -679,7 +798,9 @@
               </a:defRPr>
             </a:lvl1pPr>
           </a:lstStyle>
-          <a:p/>
+          <a:p>
+            <a:endParaRPr/>
+          </a:p>
         </p:txBody>
       </p:sp>
       <p:sp>
@@ -689,7 +810,7 @@
             <a:spLocks noGrp="1"/>
           </p:cNvSpPr>
           <p:nvPr>
-            <p:ph type="dt" idx="6" sz="half"/>
+            <p:ph type="dt" sz="half" idx="6"/>
           </p:nvPr>
         </p:nvSpPr>
         <p:spPr/>
@@ -709,7 +830,9 @@
           <a:p>
             <a:fld id="{1D8BD707-D9CF-40AE-B4C6-C98DA3205C09}" type="datetimeFigureOut">
               <a:rPr lang="en-US"/>
+              <a:t>12/19/2024</a:t>
             </a:fld>
+            <a:endParaRPr lang="en-US"/>
           </a:p>
         </p:txBody>
       </p:sp>
@@ -720,7 +843,7 @@
             <a:spLocks noGrp="1"/>
           </p:cNvSpPr>
           <p:nvPr>
-            <p:ph type="sldNum" idx="7" sz="quarter"/>
+            <p:ph type="sldNum" sz="quarter" idx="7"/>
           </p:nvPr>
         </p:nvSpPr>
         <p:spPr/>
@@ -739,8 +862,9 @@
           </a:lstStyle>
           <a:p>
             <a:fld id="{B6F15528-21DE-4FAA-801E-634DDDAF4B2B}" type="slidenum">
-              <a:t>#</a:t>
+              <a:t>‹#›</a:t>
             </a:fld>
+            <a:endParaRPr/>
           </a:p>
         </p:txBody>
       </p:sp>
@@ -753,7 +877,7 @@
 </file>
 
 <file path=ppt/slideLayouts/slideLayout5.xml><?xml version="1.0" encoding="utf-8"?>
-<p:sldLayout xmlns:a="http://schemas.openxmlformats.org/drawingml/2006/main" xmlns:r="http://schemas.openxmlformats.org/officeDocument/2006/relationships" xmlns:p="http://schemas.openxmlformats.org/presentationml/2006/main" preserve="1" type="obj">
+<p:sldLayout xmlns:a="http://schemas.openxmlformats.org/drawingml/2006/main" xmlns:r="http://schemas.openxmlformats.org/officeDocument/2006/relationships" xmlns:p="http://schemas.openxmlformats.org/presentationml/2006/main" type="obj" preserve="1">
   <p:cSld name="Blank">
     <p:spTree>
       <p:nvGrpSpPr>
@@ -776,7 +900,7 @@
             <a:spLocks noGrp="1"/>
           </p:cNvSpPr>
           <p:nvPr>
-            <p:ph type="ftr" idx="5" sz="quarter"/>
+            <p:ph type="ftr" sz="quarter" idx="5"/>
           </p:nvPr>
         </p:nvSpPr>
         <p:spPr/>
@@ -793,7 +917,9 @@
               </a:defRPr>
             </a:lvl1pPr>
           </a:lstStyle>
-          <a:p/>
+          <a:p>
+            <a:endParaRPr/>
+          </a:p>
         </p:txBody>
       </p:sp>
       <p:sp>
@@ -803,7 +929,7 @@
             <a:spLocks noGrp="1"/>
           </p:cNvSpPr>
           <p:nvPr>
-            <p:ph type="dt" idx="6" sz="half"/>
+            <p:ph type="dt" sz="half" idx="6"/>
           </p:nvPr>
         </p:nvSpPr>
         <p:spPr/>
@@ -823,7 +949,9 @@
           <a:p>
             <a:fld id="{1D8BD707-D9CF-40AE-B4C6-C98DA3205C09}" type="datetimeFigureOut">
               <a:rPr lang="en-US"/>
+              <a:t>12/19/2024</a:t>
             </a:fld>
+            <a:endParaRPr lang="en-US"/>
           </a:p>
         </p:txBody>
       </p:sp>
@@ -834,7 +962,7 @@
             <a:spLocks noGrp="1"/>
           </p:cNvSpPr>
           <p:nvPr>
-            <p:ph type="sldNum" idx="7" sz="quarter"/>
+            <p:ph type="sldNum" sz="quarter" idx="7"/>
           </p:nvPr>
         </p:nvSpPr>
         <p:spPr/>
@@ -853,8 +981,9 @@
           </a:lstStyle>
           <a:p>
             <a:fld id="{B6F15528-21DE-4FAA-801E-634DDDAF4B2B}" type="slidenum">
-              <a:t>#</a:t>
+              <a:t>‹#›</a:t>
             </a:fld>
+            <a:endParaRPr/>
           </a:p>
         </p:txBody>
       </p:sp>
@@ -891,28 +1020,6 @@
           <a:chExt cx="0" cy="0"/>
         </a:xfrm>
       </p:grpSpPr>
-      <p:pic>
-        <p:nvPicPr>
-          <p:cNvPr id="16" name="bg object 16"/>
-          <p:cNvPicPr/>
-          <p:nvPr/>
-        </p:nvPicPr>
-        <p:blipFill>
-          <a:blip r:embed="rId7" cstate="print"/>
-          <a:stretch>
-            <a:fillRect/>
-          </a:stretch>
-        </p:blipFill>
-        <p:spPr>
-          <a:xfrm>
-            <a:off x="11494007" y="6184391"/>
-            <a:ext cx="454151" cy="451104"/>
-          </a:xfrm>
-          <a:prstGeom prst="rect">
-            <a:avLst/>
-          </a:prstGeom>
-        </p:spPr>
-      </p:pic>
       <p:sp>
         <p:nvSpPr>
           <p:cNvPr id="2" name="Holder 2"/>
@@ -947,7 +1054,9 @@
               </a:defRPr>
             </a:lvl1pPr>
           </a:lstStyle>
-          <a:p/>
+          <a:p>
+            <a:endParaRPr/>
+          </a:p>
         </p:txBody>
       </p:sp>
       <p:sp>
@@ -978,7 +1087,9 @@
               <a:defRPr/>
             </a:lvl1pPr>
           </a:lstStyle>
-          <a:p/>
+          <a:p>
+            <a:endParaRPr/>
+          </a:p>
         </p:txBody>
       </p:sp>
       <p:sp>
@@ -988,7 +1099,7 @@
             <a:spLocks noGrp="1"/>
           </p:cNvSpPr>
           <p:nvPr>
-            <p:ph type="ftr" idx="5" sz="quarter"/>
+            <p:ph type="ftr" sz="quarter" idx="5"/>
           </p:nvPr>
         </p:nvSpPr>
         <p:spPr>
@@ -1015,7 +1126,9 @@
               </a:defRPr>
             </a:lvl1pPr>
           </a:lstStyle>
-          <a:p/>
+          <a:p>
+            <a:endParaRPr/>
+          </a:p>
         </p:txBody>
       </p:sp>
       <p:sp>
@@ -1025,7 +1138,7 @@
             <a:spLocks noGrp="1"/>
           </p:cNvSpPr>
           <p:nvPr>
-            <p:ph type="dt" idx="6" sz="half"/>
+            <p:ph type="dt" sz="half" idx="6"/>
           </p:nvPr>
         </p:nvSpPr>
         <p:spPr>
@@ -1055,7 +1168,9 @@
           <a:p>
             <a:fld id="{1D8BD707-D9CF-40AE-B4C6-C98DA3205C09}" type="datetimeFigureOut">
               <a:rPr lang="en-US"/>
+              <a:t>12/19/2024</a:t>
             </a:fld>
+            <a:endParaRPr lang="en-US"/>
           </a:p>
         </p:txBody>
       </p:sp>
@@ -1066,7 +1181,7 @@
             <a:spLocks noGrp="1"/>
           </p:cNvSpPr>
           <p:nvPr>
-            <p:ph type="sldNum" idx="7" sz="quarter"/>
+            <p:ph type="sldNum" sz="quarter" idx="7"/>
           </p:nvPr>
         </p:nvSpPr>
         <p:spPr>
@@ -1095,14 +1210,15 @@
           </a:lstStyle>
           <a:p>
             <a:fld id="{B6F15528-21DE-4FAA-801E-634DDDAF4B2B}" type="slidenum">
-              <a:t>#</a:t>
+              <a:t>‹#›</a:t>
             </a:fld>
+            <a:endParaRPr/>
           </a:p>
         </p:txBody>
       </p:sp>
     </p:spTree>
   </p:cSld>
-  <p:clrMap folHlink="folHlink" hlink="hlink" accent1="accent1" accent2="accent2" accent3="accent3" accent4="accent4" accent5="accent5" accent6="accent6" tx2="dk2" bg2="lt2" tx1="dk1" bg1="lt1"/>
+  <p:clrMap bg1="lt1" tx1="dk1" bg2="lt2" tx2="dk2" accent1="accent1" accent2="accent2" accent3="accent3" accent4="accent4" accent5="accent5" accent6="accent6" hlink="hlink" folHlink="folHlink"/>
   <p:sldLayoutIdLst>
     <p:sldLayoutId id="2147483661" r:id="rId1"/>
     <p:sldLayoutId id="2147483662" r:id="rId2"/>
@@ -1295,851 +1411,25 @@
       </p:pic>
       <p:sp>
         <p:nvSpPr>
-          <p:cNvPr id="3" name="object 3"/>
-          <p:cNvSpPr txBox="1"/>
-          <p:nvPr/>
+          <p:cNvPr id="7" name="object 7"/>
+          <p:cNvSpPr txBox="1">
+            <a:spLocks noGrp="1"/>
+          </p:cNvSpPr>
+          <p:nvPr>
+            <p:ph type="title"/>
+          </p:nvPr>
         </p:nvSpPr>
         <p:spPr>
           <a:xfrm>
-            <a:off x="2825375" y="4894579"/>
-            <a:ext cx="3947160" cy="1037590"/>
+            <a:off x="951384" y="2009647"/>
+            <a:ext cx="7261225" cy="711200"/>
           </a:xfrm>
           <a:prstGeom prst="rect">
             <a:avLst/>
           </a:prstGeom>
         </p:spPr>
         <p:txBody>
-          <a:bodyPr wrap="square" lIns="0" tIns="12700" rIns="0" bIns="0" rtlCol="0" vert="horz">
-            <a:spAutoFit/>
-          </a:bodyPr>
-          <a:lstStyle/>
-          <a:p>
-            <a:pPr marL="12700">
-              <a:lnSpc>
-                <a:spcPts val="2825"/>
-              </a:lnSpc>
-              <a:spcBef>
-                <a:spcPts val="100"/>
-              </a:spcBef>
-            </a:pPr>
-            <a:r>
-              <a:rPr dirty="0" sz="2400" spc="-45">
-                <a:solidFill>
-                  <a:srgbClr val="F05A28"/>
-                </a:solidFill>
-                <a:latin typeface="Verdana"/>
-                <a:cs typeface="Verdana"/>
-              </a:rPr>
-              <a:t>Samer</a:t>
-            </a:r>
-            <a:r>
-              <a:rPr dirty="0" sz="2400" spc="-170">
-                <a:solidFill>
-                  <a:srgbClr val="F05A28"/>
-                </a:solidFill>
-                <a:latin typeface="Verdana"/>
-                <a:cs typeface="Verdana"/>
-              </a:rPr>
-              <a:t> </a:t>
-            </a:r>
-            <a:r>
-              <a:rPr dirty="0" sz="2400" spc="-5">
-                <a:solidFill>
-                  <a:srgbClr val="F05A28"/>
-                </a:solidFill>
-                <a:latin typeface="Verdana"/>
-                <a:cs typeface="Verdana"/>
-              </a:rPr>
-              <a:t>Buna</a:t>
-            </a:r>
-            <a:endParaRPr sz="2400">
-              <a:latin typeface="Verdana"/>
-              <a:cs typeface="Verdana"/>
-            </a:endParaRPr>
-          </a:p>
-          <a:p>
-            <a:pPr marL="12700">
-              <a:lnSpc>
-                <a:spcPts val="1864"/>
-              </a:lnSpc>
-            </a:pPr>
-            <a:r>
-              <a:rPr dirty="0" sz="1600" spc="15">
-                <a:solidFill>
-                  <a:srgbClr val="393939"/>
-                </a:solidFill>
-                <a:latin typeface="Verdana"/>
-                <a:cs typeface="Verdana"/>
-              </a:rPr>
-              <a:t>SO</a:t>
-            </a:r>
-            <a:r>
-              <a:rPr dirty="0" sz="1600" spc="90">
-                <a:solidFill>
-                  <a:srgbClr val="393939"/>
-                </a:solidFill>
-                <a:latin typeface="Verdana"/>
-                <a:cs typeface="Verdana"/>
-              </a:rPr>
-              <a:t>FT</a:t>
-            </a:r>
-            <a:r>
-              <a:rPr dirty="0" sz="1600" spc="45">
-                <a:solidFill>
-                  <a:srgbClr val="393939"/>
-                </a:solidFill>
-                <a:latin typeface="Verdana"/>
-                <a:cs typeface="Verdana"/>
-              </a:rPr>
-              <a:t>W</a:t>
-            </a:r>
-            <a:r>
-              <a:rPr dirty="0" sz="1600" spc="165">
-                <a:solidFill>
-                  <a:srgbClr val="393939"/>
-                </a:solidFill>
-                <a:latin typeface="Verdana"/>
-                <a:cs typeface="Verdana"/>
-              </a:rPr>
-              <a:t>A</a:t>
-            </a:r>
-            <a:r>
-              <a:rPr dirty="0" sz="1600" spc="45">
-                <a:solidFill>
-                  <a:srgbClr val="393939"/>
-                </a:solidFill>
-                <a:latin typeface="Verdana"/>
-                <a:cs typeface="Verdana"/>
-              </a:rPr>
-              <a:t>R</a:t>
-            </a:r>
-            <a:r>
-              <a:rPr dirty="0" sz="1600" spc="60">
-                <a:solidFill>
-                  <a:srgbClr val="393939"/>
-                </a:solidFill>
-                <a:latin typeface="Verdana"/>
-                <a:cs typeface="Verdana"/>
-              </a:rPr>
-              <a:t>E</a:t>
-            </a:r>
-            <a:r>
-              <a:rPr dirty="0" sz="1600" spc="-90">
-                <a:solidFill>
-                  <a:srgbClr val="393939"/>
-                </a:solidFill>
-                <a:latin typeface="Verdana"/>
-                <a:cs typeface="Verdana"/>
-              </a:rPr>
-              <a:t> </a:t>
-            </a:r>
-            <a:r>
-              <a:rPr dirty="0" sz="1600" spc="165">
-                <a:solidFill>
-                  <a:srgbClr val="393939"/>
-                </a:solidFill>
-                <a:latin typeface="Verdana"/>
-                <a:cs typeface="Verdana"/>
-              </a:rPr>
-              <a:t>A</a:t>
-            </a:r>
-            <a:r>
-              <a:rPr dirty="0" sz="1600" spc="45">
-                <a:solidFill>
-                  <a:srgbClr val="393939"/>
-                </a:solidFill>
-                <a:latin typeface="Verdana"/>
-                <a:cs typeface="Verdana"/>
-              </a:rPr>
-              <a:t>R</a:t>
-            </a:r>
-            <a:r>
-              <a:rPr dirty="0" sz="1600" spc="50">
-                <a:solidFill>
-                  <a:srgbClr val="393939"/>
-                </a:solidFill>
-                <a:latin typeface="Verdana"/>
-                <a:cs typeface="Verdana"/>
-              </a:rPr>
-              <a:t>C</a:t>
-            </a:r>
-            <a:r>
-              <a:rPr dirty="0" sz="1600" spc="5">
-                <a:solidFill>
-                  <a:srgbClr val="393939"/>
-                </a:solidFill>
-                <a:latin typeface="Verdana"/>
-                <a:cs typeface="Verdana"/>
-              </a:rPr>
-              <a:t>H</a:t>
-            </a:r>
-            <a:r>
-              <a:rPr dirty="0" sz="1600" spc="-215">
-                <a:solidFill>
-                  <a:srgbClr val="393939"/>
-                </a:solidFill>
-                <a:latin typeface="Verdana"/>
-                <a:cs typeface="Verdana"/>
-              </a:rPr>
-              <a:t>I</a:t>
-            </a:r>
-            <a:r>
-              <a:rPr dirty="0" sz="1600" spc="55">
-                <a:solidFill>
-                  <a:srgbClr val="393939"/>
-                </a:solidFill>
-                <a:latin typeface="Verdana"/>
-                <a:cs typeface="Verdana"/>
-              </a:rPr>
-              <a:t>TE</a:t>
-            </a:r>
-            <a:r>
-              <a:rPr dirty="0" sz="1600" spc="50">
-                <a:solidFill>
-                  <a:srgbClr val="393939"/>
-                </a:solidFill>
-                <a:latin typeface="Verdana"/>
-                <a:cs typeface="Verdana"/>
-              </a:rPr>
-              <a:t>C</a:t>
-            </a:r>
-            <a:r>
-              <a:rPr dirty="0" sz="1600" spc="50">
-                <a:solidFill>
-                  <a:srgbClr val="393939"/>
-                </a:solidFill>
-                <a:latin typeface="Verdana"/>
-                <a:cs typeface="Verdana"/>
-              </a:rPr>
-              <a:t>T</a:t>
-            </a:r>
-            <a:r>
-              <a:rPr dirty="0" sz="1600" spc="-90">
-                <a:solidFill>
-                  <a:srgbClr val="393939"/>
-                </a:solidFill>
-                <a:latin typeface="Verdana"/>
-                <a:cs typeface="Verdana"/>
-              </a:rPr>
-              <a:t> </a:t>
-            </a:r>
-            <a:r>
-              <a:rPr dirty="0" sz="1600" spc="-175">
-                <a:solidFill>
-                  <a:srgbClr val="393939"/>
-                </a:solidFill>
-                <a:latin typeface="Verdana"/>
-                <a:cs typeface="Verdana"/>
-              </a:rPr>
-              <a:t>–</a:t>
-            </a:r>
-            <a:r>
-              <a:rPr dirty="0" sz="1600" spc="-85">
-                <a:solidFill>
-                  <a:srgbClr val="393939"/>
-                </a:solidFill>
-                <a:latin typeface="Verdana"/>
-                <a:cs typeface="Verdana"/>
-              </a:rPr>
-              <a:t> </a:t>
-            </a:r>
-            <a:r>
-              <a:rPr dirty="0" sz="1600" spc="15">
-                <a:solidFill>
-                  <a:srgbClr val="393939"/>
-                </a:solidFill>
-                <a:latin typeface="Verdana"/>
-                <a:cs typeface="Verdana"/>
-              </a:rPr>
-              <a:t>A</a:t>
-            </a:r>
-            <a:r>
-              <a:rPr dirty="0" sz="1600" spc="90">
-                <a:solidFill>
-                  <a:srgbClr val="393939"/>
-                </a:solidFill>
-                <a:latin typeface="Verdana"/>
-                <a:cs typeface="Verdana"/>
-              </a:rPr>
-              <a:t>G</a:t>
-            </a:r>
-            <a:r>
-              <a:rPr dirty="0" sz="1600" spc="-215">
-                <a:solidFill>
-                  <a:srgbClr val="393939"/>
-                </a:solidFill>
-                <a:latin typeface="Verdana"/>
-                <a:cs typeface="Verdana"/>
-              </a:rPr>
-              <a:t>I</a:t>
-            </a:r>
-            <a:r>
-              <a:rPr dirty="0" sz="1600" spc="90">
-                <a:solidFill>
-                  <a:srgbClr val="393939"/>
-                </a:solidFill>
-                <a:latin typeface="Verdana"/>
-                <a:cs typeface="Verdana"/>
-              </a:rPr>
-              <a:t>L</a:t>
-            </a:r>
-            <a:r>
-              <a:rPr dirty="0" sz="1600" spc="60">
-                <a:solidFill>
-                  <a:srgbClr val="393939"/>
-                </a:solidFill>
-                <a:latin typeface="Verdana"/>
-                <a:cs typeface="Verdana"/>
-              </a:rPr>
-              <a:t>E</a:t>
-            </a:r>
-            <a:r>
-              <a:rPr dirty="0" sz="1600" spc="90">
-                <a:solidFill>
-                  <a:srgbClr val="393939"/>
-                </a:solidFill>
-                <a:latin typeface="Verdana"/>
-                <a:cs typeface="Verdana"/>
-              </a:rPr>
-              <a:t>L</a:t>
-            </a:r>
-            <a:r>
-              <a:rPr dirty="0" sz="1600" spc="165">
-                <a:solidFill>
-                  <a:srgbClr val="393939"/>
-                </a:solidFill>
-                <a:latin typeface="Verdana"/>
-                <a:cs typeface="Verdana"/>
-              </a:rPr>
-              <a:t>A</a:t>
-            </a:r>
-            <a:r>
-              <a:rPr dirty="0" sz="1600" spc="50">
-                <a:solidFill>
-                  <a:srgbClr val="393939"/>
-                </a:solidFill>
-                <a:latin typeface="Verdana"/>
-                <a:cs typeface="Verdana"/>
-              </a:rPr>
-              <a:t>B</a:t>
-            </a:r>
-            <a:r>
-              <a:rPr dirty="0" sz="1600" spc="-70">
-                <a:solidFill>
-                  <a:srgbClr val="393939"/>
-                </a:solidFill>
-                <a:latin typeface="Verdana"/>
-                <a:cs typeface="Verdana"/>
-              </a:rPr>
-              <a:t>S</a:t>
-            </a:r>
-            <a:endParaRPr sz="1600">
-              <a:latin typeface="Verdana"/>
-              <a:cs typeface="Verdana"/>
-            </a:endParaRPr>
-          </a:p>
-          <a:p>
-            <a:pPr marL="12700">
-              <a:lnSpc>
-                <a:spcPct val="100000"/>
-              </a:lnSpc>
-              <a:spcBef>
-                <a:spcPts val="1120"/>
-              </a:spcBef>
-            </a:pPr>
-            <a:r>
-              <a:rPr dirty="0" sz="1800" spc="-45">
-                <a:solidFill>
-                  <a:srgbClr val="202020"/>
-                </a:solidFill>
-                <a:latin typeface="Verdana"/>
-                <a:cs typeface="Verdana"/>
-              </a:rPr>
-              <a:t>@</a:t>
-            </a:r>
-            <a:r>
-              <a:rPr dirty="0" sz="1800" spc="-40">
-                <a:solidFill>
-                  <a:srgbClr val="202020"/>
-                </a:solidFill>
-                <a:latin typeface="Verdana"/>
-                <a:cs typeface="Verdana"/>
-              </a:rPr>
-              <a:t>s</a:t>
-            </a:r>
-            <a:r>
-              <a:rPr dirty="0" sz="1800" spc="-55">
-                <a:solidFill>
-                  <a:srgbClr val="202020"/>
-                </a:solidFill>
-                <a:latin typeface="Verdana"/>
-                <a:cs typeface="Verdana"/>
-              </a:rPr>
-              <a:t>a</a:t>
-            </a:r>
-            <a:r>
-              <a:rPr dirty="0" sz="1800" spc="-40">
-                <a:solidFill>
-                  <a:srgbClr val="202020"/>
-                </a:solidFill>
-                <a:latin typeface="Verdana"/>
-                <a:cs typeface="Verdana"/>
-              </a:rPr>
-              <a:t>m</a:t>
-            </a:r>
-            <a:r>
-              <a:rPr dirty="0" sz="1800" spc="-15">
-                <a:solidFill>
-                  <a:srgbClr val="202020"/>
-                </a:solidFill>
-                <a:latin typeface="Verdana"/>
-                <a:cs typeface="Verdana"/>
-              </a:rPr>
-              <a:t>e</a:t>
-            </a:r>
-            <a:r>
-              <a:rPr dirty="0" sz="1800" spc="-45">
-                <a:solidFill>
-                  <a:srgbClr val="202020"/>
-                </a:solidFill>
-                <a:latin typeface="Verdana"/>
-                <a:cs typeface="Verdana"/>
-              </a:rPr>
-              <a:t>r</a:t>
-            </a:r>
-            <a:r>
-              <a:rPr dirty="0" sz="1800" spc="75">
-                <a:solidFill>
-                  <a:srgbClr val="202020"/>
-                </a:solidFill>
-                <a:latin typeface="Verdana"/>
-                <a:cs typeface="Verdana"/>
-              </a:rPr>
-              <a:t>b</a:t>
-            </a:r>
-            <a:r>
-              <a:rPr dirty="0" sz="1800" spc="-35">
-                <a:solidFill>
-                  <a:srgbClr val="202020"/>
-                </a:solidFill>
-                <a:latin typeface="Verdana"/>
-                <a:cs typeface="Verdana"/>
-              </a:rPr>
-              <a:t>una</a:t>
-            </a:r>
-            <a:r>
-              <a:rPr dirty="0" sz="1800" spc="-100">
-                <a:solidFill>
-                  <a:srgbClr val="202020"/>
-                </a:solidFill>
-                <a:latin typeface="Verdana"/>
-                <a:cs typeface="Verdana"/>
-              </a:rPr>
-              <a:t> </a:t>
-            </a:r>
-            <a:r>
-              <a:rPr dirty="0" sz="1800" spc="-275">
-                <a:solidFill>
-                  <a:srgbClr val="202020"/>
-                </a:solidFill>
-                <a:latin typeface="Verdana"/>
-                <a:cs typeface="Verdana"/>
-              </a:rPr>
-              <a:t>|</a:t>
-            </a:r>
-            <a:r>
-              <a:rPr dirty="0" sz="1800" spc="-95">
-                <a:solidFill>
-                  <a:srgbClr val="202020"/>
-                </a:solidFill>
-                <a:latin typeface="Verdana"/>
-                <a:cs typeface="Verdana"/>
-              </a:rPr>
-              <a:t> </a:t>
-            </a:r>
-            <a:r>
-              <a:rPr dirty="0" sz="1800" spc="-40">
-                <a:solidFill>
-                  <a:srgbClr val="202020"/>
-                </a:solidFill>
-                <a:latin typeface="Verdana"/>
-                <a:cs typeface="Verdana"/>
-              </a:rPr>
-              <a:t>s</a:t>
-            </a:r>
-            <a:r>
-              <a:rPr dirty="0" sz="1800" spc="-55">
-                <a:solidFill>
-                  <a:srgbClr val="202020"/>
-                </a:solidFill>
-                <a:latin typeface="Verdana"/>
-                <a:cs typeface="Verdana"/>
-              </a:rPr>
-              <a:t>a</a:t>
-            </a:r>
-            <a:r>
-              <a:rPr dirty="0" sz="1800" spc="-40">
-                <a:solidFill>
-                  <a:srgbClr val="202020"/>
-                </a:solidFill>
-                <a:latin typeface="Verdana"/>
-                <a:cs typeface="Verdana"/>
-              </a:rPr>
-              <a:t>m</a:t>
-            </a:r>
-            <a:r>
-              <a:rPr dirty="0" sz="1800" spc="-15">
-                <a:solidFill>
-                  <a:srgbClr val="202020"/>
-                </a:solidFill>
-                <a:latin typeface="Verdana"/>
-                <a:cs typeface="Verdana"/>
-              </a:rPr>
-              <a:t>e</a:t>
-            </a:r>
-            <a:r>
-              <a:rPr dirty="0" sz="1800" spc="-210">
-                <a:solidFill>
-                  <a:srgbClr val="202020"/>
-                </a:solidFill>
-                <a:latin typeface="Verdana"/>
-                <a:cs typeface="Verdana"/>
-              </a:rPr>
-              <a:t>r</a:t>
-            </a:r>
-            <a:r>
-              <a:rPr dirty="0" sz="1800" spc="-220">
-                <a:solidFill>
-                  <a:srgbClr val="202020"/>
-                </a:solidFill>
-                <a:latin typeface="Verdana"/>
-                <a:cs typeface="Verdana"/>
-              </a:rPr>
-              <a:t>.</a:t>
-            </a:r>
-            <a:r>
-              <a:rPr dirty="0" sz="1800" spc="75">
-                <a:solidFill>
-                  <a:srgbClr val="202020"/>
-                </a:solidFill>
-                <a:latin typeface="Verdana"/>
-                <a:cs typeface="Verdana"/>
-              </a:rPr>
-              <a:t>d</a:t>
-            </a:r>
-            <a:r>
-              <a:rPr dirty="0" sz="1800" spc="-60">
-                <a:solidFill>
-                  <a:srgbClr val="202020"/>
-                </a:solidFill>
-                <a:latin typeface="Verdana"/>
-                <a:cs typeface="Verdana"/>
-              </a:rPr>
-              <a:t>e</a:t>
-            </a:r>
-            <a:r>
-              <a:rPr dirty="0" sz="1800" spc="-10">
-                <a:solidFill>
-                  <a:srgbClr val="202020"/>
-                </a:solidFill>
-                <a:latin typeface="Verdana"/>
-                <a:cs typeface="Verdana"/>
-              </a:rPr>
-              <a:t>v</a:t>
-            </a:r>
-            <a:endParaRPr sz="1800">
-              <a:latin typeface="Verdana"/>
-              <a:cs typeface="Verdana"/>
-            </a:endParaRPr>
-          </a:p>
-        </p:txBody>
-      </p:sp>
-      <p:grpSp>
-        <p:nvGrpSpPr>
-          <p:cNvPr id="4" name="object 4"/>
-          <p:cNvGrpSpPr/>
-          <p:nvPr/>
-        </p:nvGrpSpPr>
-        <p:grpSpPr>
-          <a:xfrm>
-            <a:off x="954444" y="4613852"/>
-            <a:ext cx="1647189" cy="1647189"/>
-            <a:chOff x="954444" y="4613852"/>
-            <a:chExt cx="1647189" cy="1647189"/>
-          </a:xfrm>
-        </p:grpSpPr>
-        <p:pic>
-          <p:nvPicPr>
-            <p:cNvPr id="5" name="object 5"/>
-            <p:cNvPicPr/>
-            <p:nvPr/>
-          </p:nvPicPr>
-          <p:blipFill>
-            <a:blip r:embed="rId3" cstate="print"/>
-            <a:stretch>
-              <a:fillRect/>
-            </a:stretch>
-          </p:blipFill>
-          <p:spPr>
-            <a:xfrm>
-              <a:off x="963975" y="4623383"/>
-              <a:ext cx="1627631" cy="1627631"/>
-            </a:xfrm>
-            <a:prstGeom prst="rect">
-              <a:avLst/>
-            </a:prstGeom>
-          </p:spPr>
-        </p:pic>
-        <p:sp>
-          <p:nvSpPr>
-            <p:cNvPr id="6" name="object 6"/>
-            <p:cNvSpPr/>
-            <p:nvPr/>
-          </p:nvSpPr>
-          <p:spPr>
-            <a:xfrm>
-              <a:off x="959207" y="4618614"/>
-              <a:ext cx="1637664" cy="1637664"/>
-            </a:xfrm>
-            <a:custGeom>
-              <a:avLst/>
-              <a:gdLst/>
-              <a:ahLst/>
-              <a:cxnLst/>
-              <a:rect l="l" t="t" r="r" b="b"/>
-              <a:pathLst>
-                <a:path w="1637664" h="1637664">
-                  <a:moveTo>
-                    <a:pt x="818584" y="0"/>
-                  </a:moveTo>
-                  <a:lnTo>
-                    <a:pt x="902273" y="4225"/>
-                  </a:lnTo>
-                  <a:lnTo>
-                    <a:pt x="983551" y="16630"/>
-                  </a:lnTo>
-                  <a:lnTo>
-                    <a:pt x="1062003" y="36802"/>
-                  </a:lnTo>
-                  <a:lnTo>
-                    <a:pt x="1137214" y="64330"/>
-                  </a:lnTo>
-                  <a:lnTo>
-                    <a:pt x="1208772" y="98801"/>
-                  </a:lnTo>
-                  <a:lnTo>
-                    <a:pt x="1276265" y="139804"/>
-                  </a:lnTo>
-                  <a:lnTo>
-                    <a:pt x="1339281" y="186926"/>
-                  </a:lnTo>
-                  <a:lnTo>
-                    <a:pt x="1397410" y="239758"/>
-                  </a:lnTo>
-                  <a:lnTo>
-                    <a:pt x="1450242" y="297887"/>
-                  </a:lnTo>
-                  <a:lnTo>
-                    <a:pt x="1497364" y="360903"/>
-                  </a:lnTo>
-                  <a:lnTo>
-                    <a:pt x="1538367" y="428396"/>
-                  </a:lnTo>
-                  <a:lnTo>
-                    <a:pt x="1572838" y="499954"/>
-                  </a:lnTo>
-                  <a:lnTo>
-                    <a:pt x="1600366" y="575165"/>
-                  </a:lnTo>
-                  <a:lnTo>
-                    <a:pt x="1620538" y="653617"/>
-                  </a:lnTo>
-                  <a:lnTo>
-                    <a:pt x="1632943" y="734896"/>
-                  </a:lnTo>
-                  <a:lnTo>
-                    <a:pt x="1637169" y="818584"/>
-                  </a:lnTo>
-                  <a:lnTo>
-                    <a:pt x="1632943" y="902273"/>
-                  </a:lnTo>
-                  <a:lnTo>
-                    <a:pt x="1620538" y="983551"/>
-                  </a:lnTo>
-                  <a:lnTo>
-                    <a:pt x="1600366" y="1062003"/>
-                  </a:lnTo>
-                  <a:lnTo>
-                    <a:pt x="1572838" y="1137214"/>
-                  </a:lnTo>
-                  <a:lnTo>
-                    <a:pt x="1538367" y="1208772"/>
-                  </a:lnTo>
-                  <a:lnTo>
-                    <a:pt x="1497364" y="1276265"/>
-                  </a:lnTo>
-                  <a:lnTo>
-                    <a:pt x="1450242" y="1339281"/>
-                  </a:lnTo>
-                  <a:lnTo>
-                    <a:pt x="1397410" y="1397410"/>
-                  </a:lnTo>
-                  <a:lnTo>
-                    <a:pt x="1339281" y="1450242"/>
-                  </a:lnTo>
-                  <a:lnTo>
-                    <a:pt x="1276265" y="1497364"/>
-                  </a:lnTo>
-                  <a:lnTo>
-                    <a:pt x="1208772" y="1538367"/>
-                  </a:lnTo>
-                  <a:lnTo>
-                    <a:pt x="1137214" y="1572838"/>
-                  </a:lnTo>
-                  <a:lnTo>
-                    <a:pt x="1062003" y="1600366"/>
-                  </a:lnTo>
-                  <a:lnTo>
-                    <a:pt x="983551" y="1620538"/>
-                  </a:lnTo>
-                  <a:lnTo>
-                    <a:pt x="902273" y="1632943"/>
-                  </a:lnTo>
-                  <a:lnTo>
-                    <a:pt x="818584" y="1637169"/>
-                  </a:lnTo>
-                  <a:lnTo>
-                    <a:pt x="734896" y="1632943"/>
-                  </a:lnTo>
-                  <a:lnTo>
-                    <a:pt x="653617" y="1620538"/>
-                  </a:lnTo>
-                  <a:lnTo>
-                    <a:pt x="575165" y="1600366"/>
-                  </a:lnTo>
-                  <a:lnTo>
-                    <a:pt x="499954" y="1572838"/>
-                  </a:lnTo>
-                  <a:lnTo>
-                    <a:pt x="428396" y="1538367"/>
-                  </a:lnTo>
-                  <a:lnTo>
-                    <a:pt x="360903" y="1497364"/>
-                  </a:lnTo>
-                  <a:lnTo>
-                    <a:pt x="297887" y="1450242"/>
-                  </a:lnTo>
-                  <a:lnTo>
-                    <a:pt x="239758" y="1397410"/>
-                  </a:lnTo>
-                  <a:lnTo>
-                    <a:pt x="186926" y="1339281"/>
-                  </a:lnTo>
-                  <a:lnTo>
-                    <a:pt x="139804" y="1276265"/>
-                  </a:lnTo>
-                  <a:lnTo>
-                    <a:pt x="98801" y="1208772"/>
-                  </a:lnTo>
-                  <a:lnTo>
-                    <a:pt x="64330" y="1137214"/>
-                  </a:lnTo>
-                  <a:lnTo>
-                    <a:pt x="36802" y="1062003"/>
-                  </a:lnTo>
-                  <a:lnTo>
-                    <a:pt x="16630" y="983551"/>
-                  </a:lnTo>
-                  <a:lnTo>
-                    <a:pt x="4225" y="902273"/>
-                  </a:lnTo>
-                  <a:lnTo>
-                    <a:pt x="0" y="818584"/>
-                  </a:lnTo>
-                  <a:lnTo>
-                    <a:pt x="4225" y="734896"/>
-                  </a:lnTo>
-                  <a:lnTo>
-                    <a:pt x="16630" y="653617"/>
-                  </a:lnTo>
-                  <a:lnTo>
-                    <a:pt x="36802" y="575165"/>
-                  </a:lnTo>
-                  <a:lnTo>
-                    <a:pt x="64330" y="499954"/>
-                  </a:lnTo>
-                  <a:lnTo>
-                    <a:pt x="98801" y="428396"/>
-                  </a:lnTo>
-                  <a:lnTo>
-                    <a:pt x="139804" y="360903"/>
-                  </a:lnTo>
-                  <a:lnTo>
-                    <a:pt x="186926" y="297887"/>
-                  </a:lnTo>
-                  <a:lnTo>
-                    <a:pt x="239758" y="239758"/>
-                  </a:lnTo>
-                  <a:lnTo>
-                    <a:pt x="297887" y="186926"/>
-                  </a:lnTo>
-                  <a:lnTo>
-                    <a:pt x="360903" y="139804"/>
-                  </a:lnTo>
-                  <a:lnTo>
-                    <a:pt x="428396" y="98801"/>
-                  </a:lnTo>
-                  <a:lnTo>
-                    <a:pt x="499954" y="64330"/>
-                  </a:lnTo>
-                  <a:lnTo>
-                    <a:pt x="575165" y="36802"/>
-                  </a:lnTo>
-                  <a:lnTo>
-                    <a:pt x="653617" y="16630"/>
-                  </a:lnTo>
-                  <a:lnTo>
-                    <a:pt x="734896" y="4225"/>
-                  </a:lnTo>
-                  <a:lnTo>
-                    <a:pt x="818584" y="0"/>
-                  </a:lnTo>
-                  <a:close/>
-                </a:path>
-              </a:pathLst>
-            </a:custGeom>
-            <a:ln w="9525">
-              <a:solidFill>
-                <a:srgbClr val="F8F8F8"/>
-              </a:solidFill>
-            </a:ln>
-          </p:spPr>
-          <p:txBody>
-            <a:bodyPr wrap="square" lIns="0" tIns="0" rIns="0" bIns="0" rtlCol="0"/>
-            <a:lstStyle/>
-            <a:p/>
-          </p:txBody>
-        </p:sp>
-      </p:grpSp>
-      <p:sp>
-        <p:nvSpPr>
-          <p:cNvPr id="7" name="object 7"/>
-          <p:cNvSpPr txBox="1">
-            <a:spLocks noGrp="1"/>
-          </p:cNvSpPr>
-          <p:nvPr>
-            <p:ph type="title"/>
-          </p:nvPr>
-        </p:nvSpPr>
-        <p:spPr>
-          <a:xfrm>
-            <a:off x="951384" y="2009647"/>
-            <a:ext cx="7261225" cy="711200"/>
-          </a:xfrm>
-          <a:prstGeom prst="rect"/>
-        </p:spPr>
-        <p:txBody>
-          <a:bodyPr wrap="square" lIns="0" tIns="12700" rIns="0" bIns="0" rtlCol="0" vert="horz">
+          <a:bodyPr vert="horz" wrap="square" lIns="0" tIns="12700" rIns="0" bIns="0" rtlCol="0">
             <a:spAutoFit/>
           </a:bodyPr>
           <a:lstStyle/>
@@ -2153,7 +1443,7 @@
               </a:spcBef>
             </a:pPr>
             <a:r>
-              <a:rPr dirty="0" sz="4500" spc="20">
+              <a:rPr sz="4500" spc="20" dirty="0">
                 <a:solidFill>
                   <a:srgbClr val="171717"/>
                 </a:solidFill>
@@ -2161,7 +1451,7 @@
               <a:t>W</a:t>
             </a:r>
             <a:r>
-              <a:rPr dirty="0" sz="4500" spc="160">
+              <a:rPr sz="4500" spc="160" dirty="0">
                 <a:solidFill>
                   <a:srgbClr val="171717"/>
                 </a:solidFill>
@@ -2169,7 +1459,7 @@
               <a:t>o</a:t>
             </a:r>
             <a:r>
-              <a:rPr dirty="0" sz="4500" spc="-210">
+              <a:rPr sz="4500" spc="-210" dirty="0">
                 <a:solidFill>
                   <a:srgbClr val="171717"/>
                 </a:solidFill>
@@ -2177,7 +1467,7 @@
               <a:t>r</a:t>
             </a:r>
             <a:r>
-              <a:rPr dirty="0" sz="4500" spc="-215">
+              <a:rPr sz="4500" spc="-215" dirty="0">
                 <a:solidFill>
                   <a:srgbClr val="171717"/>
                 </a:solidFill>
@@ -2185,7 +1475,7 @@
               <a:t>k</a:t>
             </a:r>
             <a:r>
-              <a:rPr dirty="0" sz="4500" spc="-165">
+              <a:rPr sz="4500" spc="-165" dirty="0">
                 <a:solidFill>
                   <a:srgbClr val="171717"/>
                 </a:solidFill>
@@ -2193,7 +1483,7 @@
               <a:t>i</a:t>
             </a:r>
             <a:r>
-              <a:rPr dirty="0" sz="4500" spc="-190">
+              <a:rPr sz="4500" spc="-190" dirty="0">
                 <a:solidFill>
                   <a:srgbClr val="171717"/>
                 </a:solidFill>
@@ -2201,7 +1491,7 @@
               <a:t>n</a:t>
             </a:r>
             <a:r>
-              <a:rPr dirty="0" sz="4500" spc="180">
+              <a:rPr sz="4500" spc="180" dirty="0">
                 <a:solidFill>
                   <a:srgbClr val="171717"/>
                 </a:solidFill>
@@ -2209,7 +1499,7 @@
               <a:t>g</a:t>
             </a:r>
             <a:r>
-              <a:rPr dirty="0" sz="4500" spc="-459">
+              <a:rPr sz="4500" spc="-459" dirty="0">
                 <a:solidFill>
                   <a:srgbClr val="171717"/>
                 </a:solidFill>
@@ -2217,7 +1507,7 @@
               <a:t> </a:t>
             </a:r>
             <a:r>
-              <a:rPr dirty="0" sz="4500" spc="80">
+              <a:rPr sz="4500" spc="80" dirty="0">
                 <a:solidFill>
                   <a:srgbClr val="171717"/>
                 </a:solidFill>
@@ -2225,7 +1515,7 @@
               <a:t>w</a:t>
             </a:r>
             <a:r>
-              <a:rPr dirty="0" sz="4500" spc="-165">
+              <a:rPr sz="4500" spc="-165" dirty="0">
                 <a:solidFill>
                   <a:srgbClr val="171717"/>
                 </a:solidFill>
@@ -2233,39 +1523,63 @@
               <a:t>i</a:t>
             </a:r>
             <a:r>
-              <a:rPr dirty="0" sz="4500" spc="-80">
+              <a:rPr sz="4500" spc="-80" dirty="0">
                 <a:solidFill>
                   <a:srgbClr val="171717"/>
                 </a:solidFill>
               </a:rPr>
-              <a:t>t</a:t>
-            </a:r>
-            <a:r>
-              <a:rPr dirty="0" sz="4500" spc="-80">
+              <a:t>th</a:t>
+            </a:r>
+            <a:r>
+              <a:rPr sz="4500" spc="-459" dirty="0">
                 <a:solidFill>
                   <a:srgbClr val="171717"/>
                 </a:solidFill>
               </a:rPr>
-              <a:t>h</a:t>
-            </a:r>
-            <a:r>
-              <a:rPr dirty="0" sz="4500" spc="-459">
+              <a:t> </a:t>
+            </a:r>
+            <a:r>
+              <a:rPr sz="4500" spc="-95" dirty="0">
                 <a:solidFill>
                   <a:srgbClr val="171717"/>
                 </a:solidFill>
               </a:rPr>
+              <a:t>W</a:t>
+            </a:r>
+            <a:r>
+              <a:rPr sz="4500" spc="75" dirty="0">
+                <a:solidFill>
+                  <a:srgbClr val="171717"/>
+                </a:solidFill>
+              </a:rPr>
+              <a:t>e</a:t>
+            </a:r>
+            <a:r>
+              <a:rPr sz="4500" spc="180" dirty="0">
+                <a:solidFill>
+                  <a:srgbClr val="171717"/>
+                </a:solidFill>
+              </a:rPr>
+              <a:t>b</a:t>
+            </a:r>
+            <a:r>
+              <a:rPr sz="4500" spc="-459" dirty="0">
+                <a:solidFill>
+                  <a:srgbClr val="171717"/>
+                </a:solidFill>
+              </a:rPr>
               <a:t> </a:t>
             </a:r>
             <a:r>
-              <a:rPr dirty="0" sz="4500" spc="-95">
+              <a:rPr sz="4500" spc="-320" dirty="0">
                 <a:solidFill>
                   <a:srgbClr val="171717"/>
                 </a:solidFill>
               </a:rPr>
-              <a:t>W</a:t>
-            </a:r>
-            <a:r>
-              <a:rPr dirty="0" sz="4500" spc="75">
+              <a:t>S</a:t>
+            </a:r>
+            <a:r>
+              <a:rPr sz="4500" spc="-135" dirty="0">
                 <a:solidFill>
                   <a:srgbClr val="171717"/>
                 </a:solidFill>
@@ -2273,71 +1587,39 @@
               <a:t>e</a:t>
             </a:r>
             <a:r>
-              <a:rPr dirty="0" sz="4500" spc="180">
+              <a:rPr sz="4500" spc="-210" dirty="0">
                 <a:solidFill>
                   <a:srgbClr val="171717"/>
                 </a:solidFill>
               </a:rPr>
-              <a:t>b</a:t>
-            </a:r>
-            <a:r>
-              <a:rPr dirty="0" sz="4500" spc="-459">
+              <a:t>r</a:t>
+            </a:r>
+            <a:r>
+              <a:rPr sz="4500" spc="-275" dirty="0">
                 <a:solidFill>
                   <a:srgbClr val="171717"/>
                 </a:solidFill>
               </a:rPr>
-              <a:t> </a:t>
-            </a:r>
-            <a:r>
-              <a:rPr dirty="0" sz="4500" spc="-320">
+              <a:t>v</a:t>
+            </a:r>
+            <a:r>
+              <a:rPr sz="4500" spc="-135" dirty="0">
                 <a:solidFill>
                   <a:srgbClr val="171717"/>
                 </a:solidFill>
               </a:rPr>
-              <a:t>S</a:t>
-            </a:r>
-            <a:r>
-              <a:rPr dirty="0" sz="4500" spc="-135">
+              <a:t>e</a:t>
+            </a:r>
+            <a:r>
+              <a:rPr sz="4500" spc="-210" dirty="0">
                 <a:solidFill>
                   <a:srgbClr val="171717"/>
                 </a:solidFill>
               </a:rPr>
-              <a:t>e</a:t>
-            </a:r>
-            <a:r>
-              <a:rPr dirty="0" sz="4500" spc="-210">
-                <a:solidFill>
-                  <a:srgbClr val="171717"/>
-                </a:solidFill>
-              </a:rPr>
               <a:t>r</a:t>
             </a:r>
             <a:r>
-              <a:rPr dirty="0" sz="4500" spc="-275">
-                <a:solidFill>
-                  <a:srgbClr val="171717"/>
-                </a:solidFill>
-              </a:rPr>
-              <a:t>v</a:t>
-            </a:r>
-            <a:r>
-              <a:rPr dirty="0" sz="4500" spc="-135">
-                <a:solidFill>
-                  <a:srgbClr val="171717"/>
-                </a:solidFill>
-              </a:rPr>
-              <a:t>e</a:t>
-            </a:r>
-            <a:r>
-              <a:rPr dirty="0" sz="4500" spc="-210">
-                <a:solidFill>
-                  <a:srgbClr val="171717"/>
-                </a:solidFill>
-              </a:rPr>
-              <a:t>r</a:t>
-            </a:r>
-            <a:r>
-              <a:rPr dirty="0" sz="4500" spc="-105">
+              <a:rPr sz="4500" spc="-105" dirty="0">
                 <a:solidFill>
                   <a:srgbClr val="171717"/>
                 </a:solidFill>
@@ -2406,10 +1688,12 @@
           </p:nvPr>
         </p:nvSpPr>
         <p:spPr>
-          <a:prstGeom prst="rect"/>
+          <a:prstGeom prst="rect">
+            <a:avLst/>
+          </a:prstGeom>
         </p:spPr>
         <p:txBody>
-          <a:bodyPr wrap="square" lIns="0" tIns="12700" rIns="0" bIns="0" rtlCol="0" vert="horz">
+          <a:bodyPr vert="horz" wrap="square" lIns="0" tIns="12700" rIns="0" bIns="0" rtlCol="0">
             <a:spAutoFit/>
           </a:bodyPr>
           <a:lstStyle/>
@@ -2423,23 +1707,23 @@
               </a:spcBef>
             </a:pPr>
             <a:r>
-              <a:rPr dirty="0" spc="85"/>
+              <a:rPr spc="85" dirty="0"/>
               <a:t>Node</a:t>
             </a:r>
             <a:r>
-              <a:rPr dirty="0" spc="-155"/>
+              <a:rPr spc="-155" dirty="0"/>
               <a:t> </a:t>
             </a:r>
             <a:r>
-              <a:rPr dirty="0" spc="35"/>
+              <a:rPr spc="35" dirty="0"/>
               <a:t>for</a:t>
             </a:r>
             <a:r>
-              <a:rPr dirty="0" spc="-155"/>
+              <a:rPr spc="-155" dirty="0"/>
               <a:t> </a:t>
             </a:r>
             <a:r>
-              <a:rPr dirty="0" spc="55"/>
+              <a:rPr spc="55" dirty="0"/>
               <a:t>web</a:t>
             </a:r>
           </a:p>
@@ -2457,27 +1741,27 @@
               <a:t>Built-in</a:t>
             </a:r>
             <a:r>
-              <a:rPr dirty="0" spc="-165"/>
+              <a:rPr spc="-165" dirty="0"/>
               <a:t> </a:t>
             </a:r>
             <a:r>
-              <a:rPr dirty="0" spc="15"/>
+              <a:rPr spc="15" dirty="0"/>
               <a:t>modules </a:t>
             </a:r>
             <a:r>
-              <a:rPr dirty="0" spc="-825"/>
+              <a:rPr spc="-825" dirty="0"/>
               <a:t> </a:t>
             </a:r>
             <a:r>
-              <a:rPr dirty="0" spc="40"/>
+              <a:rPr spc="40" dirty="0"/>
               <a:t>Reloading</a:t>
             </a:r>
             <a:r>
-              <a:rPr dirty="0" spc="-160"/>
+              <a:rPr spc="-160" dirty="0"/>
               <a:t> </a:t>
             </a:r>
             <a:r>
-              <a:rPr dirty="0" spc="85"/>
+              <a:rPr spc="85" dirty="0"/>
               <a:t>Node</a:t>
             </a:r>
           </a:p>
@@ -2499,7 +1783,7 @@
           </a:prstGeom>
         </p:spPr>
         <p:txBody>
-          <a:bodyPr wrap="square" lIns="0" tIns="12700" rIns="0" bIns="0" rtlCol="0" vert="horz">
+          <a:bodyPr vert="horz" wrap="square" lIns="0" tIns="12700" rIns="0" bIns="0" rtlCol="0">
             <a:spAutoFit/>
           </a:bodyPr>
           <a:lstStyle/>
@@ -2513,7 +1797,7 @@
               </a:spcBef>
             </a:pPr>
             <a:r>
-              <a:rPr dirty="0" sz="2400" spc="10">
+              <a:rPr sz="2400" spc="10" dirty="0">
                 <a:solidFill>
                   <a:srgbClr val="F05A28"/>
                 </a:solidFill>
@@ -2523,7 +1807,7 @@
               <a:t>The</a:t>
             </a:r>
             <a:r>
-              <a:rPr dirty="0" sz="2400" spc="-135">
+              <a:rPr sz="2400" spc="-135" dirty="0">
                 <a:solidFill>
                   <a:srgbClr val="F05A28"/>
                 </a:solidFill>
@@ -2533,7 +1817,7 @@
               <a:t> </a:t>
             </a:r>
             <a:r>
-              <a:rPr dirty="0" sz="2400" spc="45">
+              <a:rPr sz="2400" spc="45" dirty="0">
                 <a:solidFill>
                   <a:srgbClr val="F05A28"/>
                 </a:solidFill>
@@ -2543,7 +1827,7 @@
               <a:t>“req”</a:t>
             </a:r>
             <a:r>
-              <a:rPr dirty="0" sz="2400" spc="-135">
+              <a:rPr sz="2400" spc="-135" dirty="0">
                 <a:solidFill>
                   <a:srgbClr val="F05A28"/>
                 </a:solidFill>
@@ -2553,7 +1837,7 @@
               <a:t> </a:t>
             </a:r>
             <a:r>
-              <a:rPr dirty="0" sz="2400" spc="10">
+              <a:rPr sz="2400" spc="10" dirty="0">
                 <a:solidFill>
                   <a:srgbClr val="F05A28"/>
                 </a:solidFill>
@@ -2563,7 +1847,7 @@
               <a:t>and</a:t>
             </a:r>
             <a:r>
-              <a:rPr dirty="0" sz="2400" spc="-130">
+              <a:rPr sz="2400" spc="-130" dirty="0">
                 <a:solidFill>
                   <a:srgbClr val="F05A28"/>
                 </a:solidFill>
@@ -2573,7 +1857,7 @@
               <a:t> </a:t>
             </a:r>
             <a:r>
-              <a:rPr dirty="0" sz="2400" spc="15">
+              <a:rPr sz="2400" spc="15" dirty="0">
                 <a:solidFill>
                   <a:srgbClr val="F05A28"/>
                 </a:solidFill>
@@ -2583,7 +1867,7 @@
               <a:t>“res”</a:t>
             </a:r>
             <a:r>
-              <a:rPr dirty="0" sz="2400" spc="-135">
+              <a:rPr sz="2400" spc="-135" dirty="0">
                 <a:solidFill>
                   <a:srgbClr val="F05A28"/>
                 </a:solidFill>
@@ -2593,7 +1877,7 @@
               <a:t> </a:t>
             </a:r>
             <a:r>
-              <a:rPr dirty="0" sz="2400" spc="30">
+              <a:rPr sz="2400" spc="30" dirty="0">
                 <a:solidFill>
                   <a:srgbClr val="F05A28"/>
                 </a:solidFill>
@@ -2614,7 +1898,7 @@
               </a:lnSpc>
             </a:pPr>
             <a:r>
-              <a:rPr dirty="0" sz="2400" spc="30">
+              <a:rPr sz="2400" spc="30" dirty="0">
                 <a:solidFill>
                   <a:srgbClr val="F05A28"/>
                 </a:solidFill>
@@ -2624,7 +1908,7 @@
               <a:t>E</a:t>
             </a:r>
             <a:r>
-              <a:rPr dirty="0" sz="2400" spc="25">
+              <a:rPr sz="2400" spc="25" dirty="0">
                 <a:solidFill>
                   <a:srgbClr val="F05A28"/>
                 </a:solidFill>
@@ -2634,7 +1918,7 @@
               <a:t>x</a:t>
             </a:r>
             <a:r>
-              <a:rPr dirty="0" sz="2400" spc="45">
+              <a:rPr sz="2400" spc="45" dirty="0">
                 <a:solidFill>
                   <a:srgbClr val="F05A28"/>
                 </a:solidFill>
@@ -2644,7 +1928,7 @@
               <a:t>p</a:t>
             </a:r>
             <a:r>
-              <a:rPr dirty="0" sz="2400" spc="-20">
+              <a:rPr sz="2400" spc="-20" dirty="0">
                 <a:solidFill>
                   <a:srgbClr val="F05A28"/>
                 </a:solidFill>
@@ -2654,7 +1938,7 @@
               <a:t>r</a:t>
             </a:r>
             <a:r>
-              <a:rPr dirty="0" sz="2400" spc="10">
+              <a:rPr sz="2400" spc="10" dirty="0">
                 <a:solidFill>
                   <a:srgbClr val="F05A28"/>
                 </a:solidFill>
@@ -2664,7 +1948,7 @@
               <a:t>e</a:t>
             </a:r>
             <a:r>
-              <a:rPr dirty="0" sz="2400" spc="-80">
+              <a:rPr sz="2400" spc="-80" dirty="0">
                 <a:solidFill>
                   <a:srgbClr val="F05A28"/>
                 </a:solidFill>
@@ -2674,7 +1958,7 @@
               <a:t>s</a:t>
             </a:r>
             <a:r>
-              <a:rPr dirty="0" sz="2400" spc="-40">
+              <a:rPr sz="2400" spc="-40" dirty="0">
                 <a:solidFill>
                   <a:srgbClr val="F05A28"/>
                 </a:solidFill>
@@ -2684,7 +1968,7 @@
               <a:t>s  </a:t>
             </a:r>
             <a:r>
-              <a:rPr dirty="0" sz="2400" spc="75">
+              <a:rPr sz="2400" spc="75" dirty="0">
                 <a:solidFill>
                   <a:srgbClr val="F05A28"/>
                 </a:solidFill>
@@ -2716,7 +2000,7 @@
           </a:prstGeom>
         </p:spPr>
         <p:txBody>
-          <a:bodyPr wrap="square" lIns="0" tIns="12700" rIns="0" bIns="0" rtlCol="0" vert="horz">
+          <a:bodyPr vert="horz" wrap="square" lIns="0" tIns="12700" rIns="0" bIns="0" rtlCol="0">
             <a:spAutoFit/>
           </a:bodyPr>
           <a:lstStyle/>
@@ -2730,7 +2014,7 @@
               </a:spcBef>
             </a:pPr>
             <a:r>
-              <a:rPr dirty="0" sz="3600" spc="25">
+              <a:rPr sz="3600" spc="25" dirty="0">
                 <a:solidFill>
                   <a:srgbClr val="FFFFFF"/>
                 </a:solidFill>
@@ -2740,7 +2024,7 @@
               <a:t>Wrap</a:t>
             </a:r>
             <a:r>
-              <a:rPr dirty="0" sz="3600" spc="-270">
+              <a:rPr sz="3600" spc="-270" dirty="0">
                 <a:solidFill>
                   <a:srgbClr val="FFFFFF"/>
                 </a:solidFill>
@@ -2750,224 +2034,7 @@
               <a:t> </a:t>
             </a:r>
             <a:r>
-              <a:rPr dirty="0" sz="3600" spc="114">
-                <a:solidFill>
-                  <a:srgbClr val="FFFFFF"/>
-                </a:solidFill>
-                <a:latin typeface="Verdana"/>
-                <a:cs typeface="Verdana"/>
-              </a:rPr>
-              <a:t>Up</a:t>
-            </a:r>
-            <a:endParaRPr sz="3600">
-              <a:latin typeface="Verdana"/>
-              <a:cs typeface="Verdana"/>
-            </a:endParaRPr>
-          </a:p>
-        </p:txBody>
-      </p:sp>
-    </p:spTree>
-  </p:cSld>
-  <p:clrMapOvr>
-    <a:masterClrMapping/>
-  </p:clrMapOvr>
-</p:sld>
-</file>
-
-<file path=ppt/slides/slide3.xml><?xml version="1.0" encoding="utf-8"?>
-<p:sld xmlns:a="http://schemas.openxmlformats.org/drawingml/2006/main" xmlns:r="http://schemas.openxmlformats.org/officeDocument/2006/relationships" xmlns:p="http://schemas.openxmlformats.org/presentationml/2006/main">
-  <p:cSld>
-    <p:spTree>
-      <p:nvGrpSpPr>
-        <p:cNvPr id="1" name=""/>
-        <p:cNvGrpSpPr/>
-        <p:nvPr/>
-      </p:nvGrpSpPr>
-      <p:grpSpPr>
-        <a:xfrm>
-          <a:off x="0" y="0"/>
-          <a:ext cx="0" cy="0"/>
-          <a:chOff x="0" y="0"/>
-          <a:chExt cx="0" cy="0"/>
-        </a:xfrm>
-      </p:grpSpPr>
-      <p:sp>
-        <p:nvSpPr>
-          <p:cNvPr id="2" name="object 2"/>
-          <p:cNvSpPr txBox="1"/>
-          <p:nvPr/>
-        </p:nvSpPr>
-        <p:spPr>
-          <a:xfrm>
-            <a:off x="5583342" y="3116790"/>
-            <a:ext cx="5711190" cy="384175"/>
-          </a:xfrm>
-          <a:prstGeom prst="rect">
-            <a:avLst/>
-          </a:prstGeom>
-        </p:spPr>
-        <p:txBody>
-          <a:bodyPr wrap="square" lIns="0" tIns="12700" rIns="0" bIns="0" rtlCol="0" vert="horz">
-            <a:spAutoFit/>
-          </a:bodyPr>
-          <a:lstStyle/>
-          <a:p>
-            <a:pPr marL="12700">
-              <a:lnSpc>
-                <a:spcPct val="100000"/>
-              </a:lnSpc>
-              <a:spcBef>
-                <a:spcPts val="100"/>
-              </a:spcBef>
-            </a:pPr>
-            <a:r>
-              <a:rPr dirty="0" sz="2350" spc="114">
-                <a:solidFill>
-                  <a:srgbClr val="F05A28"/>
-                </a:solidFill>
-                <a:latin typeface="Verdana"/>
-                <a:cs typeface="Verdana"/>
-              </a:rPr>
-              <a:t>Working</a:t>
-            </a:r>
-            <a:r>
-              <a:rPr dirty="0" sz="2350" spc="-35">
-                <a:solidFill>
-                  <a:srgbClr val="F05A28"/>
-                </a:solidFill>
-                <a:latin typeface="Verdana"/>
-                <a:cs typeface="Verdana"/>
-              </a:rPr>
-              <a:t> </a:t>
-            </a:r>
-            <a:r>
-              <a:rPr dirty="0" sz="2350" spc="95">
-                <a:solidFill>
-                  <a:srgbClr val="F05A28"/>
-                </a:solidFill>
-                <a:latin typeface="Verdana"/>
-                <a:cs typeface="Verdana"/>
-              </a:rPr>
-              <a:t>with</a:t>
-            </a:r>
-            <a:r>
-              <a:rPr dirty="0" sz="2350" spc="-25">
-                <a:solidFill>
-                  <a:srgbClr val="F05A28"/>
-                </a:solidFill>
-                <a:latin typeface="Verdana"/>
-                <a:cs typeface="Verdana"/>
-              </a:rPr>
-              <a:t> </a:t>
-            </a:r>
-            <a:r>
-              <a:rPr dirty="0" sz="2350" spc="65">
-                <a:solidFill>
-                  <a:srgbClr val="F05A28"/>
-                </a:solidFill>
-                <a:latin typeface="Verdana"/>
-                <a:cs typeface="Verdana"/>
-              </a:rPr>
-              <a:t>the</a:t>
-            </a:r>
-            <a:r>
-              <a:rPr dirty="0" sz="2350" spc="-25">
-                <a:solidFill>
-                  <a:srgbClr val="F05A28"/>
-                </a:solidFill>
-                <a:latin typeface="Verdana"/>
-                <a:cs typeface="Verdana"/>
-              </a:rPr>
-              <a:t> </a:t>
-            </a:r>
-            <a:r>
-              <a:rPr dirty="0" sz="2350" spc="100">
-                <a:solidFill>
-                  <a:srgbClr val="F05A28"/>
-                </a:solidFill>
-                <a:latin typeface="Verdana"/>
-                <a:cs typeface="Verdana"/>
-              </a:rPr>
-              <a:t>Operating</a:t>
-            </a:r>
-            <a:r>
-              <a:rPr dirty="0" sz="2350" spc="-30">
-                <a:solidFill>
-                  <a:srgbClr val="F05A28"/>
-                </a:solidFill>
-                <a:latin typeface="Verdana"/>
-                <a:cs typeface="Verdana"/>
-              </a:rPr>
-              <a:t> </a:t>
-            </a:r>
-            <a:r>
-              <a:rPr dirty="0" sz="2350" spc="20">
-                <a:solidFill>
-                  <a:srgbClr val="F05A28"/>
-                </a:solidFill>
-                <a:latin typeface="Verdana"/>
-                <a:cs typeface="Verdana"/>
-              </a:rPr>
-              <a:t>System</a:t>
-            </a:r>
-            <a:endParaRPr sz="2350">
-              <a:latin typeface="Verdana"/>
-              <a:cs typeface="Verdana"/>
-            </a:endParaRPr>
-          </a:p>
-        </p:txBody>
-      </p:sp>
-      <p:sp>
-        <p:nvSpPr>
-          <p:cNvPr id="3" name="object 3"/>
-          <p:cNvSpPr txBox="1"/>
-          <p:nvPr/>
-        </p:nvSpPr>
-        <p:spPr>
-          <a:xfrm>
-            <a:off x="1383219" y="1922779"/>
-            <a:ext cx="1870075" cy="574040"/>
-          </a:xfrm>
-          <a:prstGeom prst="rect">
-            <a:avLst/>
-          </a:prstGeom>
-        </p:spPr>
-        <p:txBody>
-          <a:bodyPr wrap="square" lIns="0" tIns="12700" rIns="0" bIns="0" rtlCol="0" vert="horz">
-            <a:spAutoFit/>
-          </a:bodyPr>
-          <a:lstStyle/>
-          <a:p>
-            <a:pPr marL="12700">
-              <a:lnSpc>
-                <a:spcPct val="100000"/>
-              </a:lnSpc>
-              <a:spcBef>
-                <a:spcPts val="100"/>
-              </a:spcBef>
-            </a:pPr>
-            <a:r>
-              <a:rPr dirty="0" sz="3600" spc="-15">
-                <a:solidFill>
-                  <a:srgbClr val="FFFFFF"/>
-                </a:solidFill>
-                <a:latin typeface="Verdana"/>
-                <a:cs typeface="Verdana"/>
-              </a:rPr>
-              <a:t>Next</a:t>
-            </a:r>
-            <a:r>
-              <a:rPr dirty="0" sz="3600" spc="-280">
-                <a:solidFill>
-                  <a:srgbClr val="FFFFFF"/>
-                </a:solidFill>
-                <a:latin typeface="Verdana"/>
-                <a:cs typeface="Verdana"/>
-              </a:rPr>
-              <a:t> </a:t>
-            </a:r>
-            <a:r>
-              <a:rPr dirty="0" sz="3600" spc="114">
+              <a:rPr sz="3600" spc="114" dirty="0">
                 <a:solidFill>
                   <a:srgbClr val="FFFFFF"/>
                 </a:solidFill>

</xml_diff>